<commit_message>
updated task chart, a bit more features
</commit_message>
<xml_diff>
--- a/com.blackout.solarpanelcalculator/docs/stories4Iteration4.pptx
+++ b/com.blackout.solarpanelcalculator/docs/stories4Iteration4.pptx
@@ -302,7 +302,7 @@
                 </a:solidFill>
               </a:rPr>
               <a:pPr/>
-              <a:t>1/10/2012</a:t>
+              <a:t>9/10/2012</a:t>
             </a:fld>
             <a:endParaRPr lang="en-AU">
               <a:solidFill>
@@ -504,7 +504,7 @@
                 </a:solidFill>
               </a:rPr>
               <a:pPr/>
-              <a:t>1/10/2012</a:t>
+              <a:t>9/10/2012</a:t>
             </a:fld>
             <a:endParaRPr lang="en-AU">
               <a:solidFill>
@@ -716,7 +716,7 @@
                 </a:solidFill>
               </a:rPr>
               <a:pPr/>
-              <a:t>1/10/2012</a:t>
+              <a:t>9/10/2012</a:t>
             </a:fld>
             <a:endParaRPr lang="en-AU">
               <a:solidFill>
@@ -990,7 +990,7 @@
                 </a:solidFill>
               </a:rPr>
               <a:pPr/>
-              <a:t>1/10/2012</a:t>
+              <a:t>9/10/2012</a:t>
             </a:fld>
             <a:endParaRPr lang="en-AU">
               <a:solidFill>
@@ -1192,7 +1192,7 @@
                 </a:solidFill>
               </a:rPr>
               <a:pPr/>
-              <a:t>1/10/2012</a:t>
+              <a:t>9/10/2012</a:t>
             </a:fld>
             <a:endParaRPr lang="en-AU">
               <a:solidFill>
@@ -1470,7 +1470,7 @@
                 </a:solidFill>
               </a:rPr>
               <a:pPr/>
-              <a:t>1/10/2012</a:t>
+              <a:t>9/10/2012</a:t>
             </a:fld>
             <a:endParaRPr lang="en-AU">
               <a:solidFill>
@@ -1790,7 +1790,7 @@
                 </a:solidFill>
               </a:rPr>
               <a:pPr/>
-              <a:t>1/10/2012</a:t>
+              <a:t>9/10/2012</a:t>
             </a:fld>
             <a:endParaRPr lang="en-AU">
               <a:solidFill>
@@ -2244,7 +2244,7 @@
                 </a:solidFill>
               </a:rPr>
               <a:pPr/>
-              <a:t>1/10/2012</a:t>
+              <a:t>9/10/2012</a:t>
             </a:fld>
             <a:endParaRPr lang="en-AU">
               <a:solidFill>
@@ -2394,7 +2394,7 @@
                 </a:solidFill>
               </a:rPr>
               <a:pPr/>
-              <a:t>1/10/2012</a:t>
+              <a:t>9/10/2012</a:t>
             </a:fld>
             <a:endParaRPr lang="en-AU">
               <a:solidFill>
@@ -2521,7 +2521,7 @@
                 </a:solidFill>
               </a:rPr>
               <a:pPr/>
-              <a:t>1/10/2012</a:t>
+              <a:t>9/10/2012</a:t>
             </a:fld>
             <a:endParaRPr lang="en-AU">
               <a:solidFill>
@@ -2830,7 +2830,7 @@
                 </a:solidFill>
               </a:rPr>
               <a:pPr/>
-              <a:t>1/10/2012</a:t>
+              <a:t>9/10/2012</a:t>
             </a:fld>
             <a:endParaRPr lang="en-AU">
               <a:solidFill>
@@ -3032,7 +3032,7 @@
                 </a:solidFill>
               </a:rPr>
               <a:pPr/>
-              <a:t>1/10/2012</a:t>
+              <a:t>9/10/2012</a:t>
             </a:fld>
             <a:endParaRPr lang="en-AU">
               <a:solidFill>
@@ -3317,7 +3317,7 @@
                 </a:solidFill>
               </a:rPr>
               <a:pPr/>
-              <a:t>1/10/2012</a:t>
+              <a:t>9/10/2012</a:t>
             </a:fld>
             <a:endParaRPr lang="en-AU">
               <a:solidFill>
@@ -3519,7 +3519,7 @@
                 </a:solidFill>
               </a:rPr>
               <a:pPr/>
-              <a:t>1/10/2012</a:t>
+              <a:t>9/10/2012</a:t>
             </a:fld>
             <a:endParaRPr lang="en-AU">
               <a:solidFill>
@@ -3731,7 +3731,7 @@
                 </a:solidFill>
               </a:rPr>
               <a:pPr/>
-              <a:t>1/10/2012</a:t>
+              <a:t>9/10/2012</a:t>
             </a:fld>
             <a:endParaRPr lang="en-AU">
               <a:solidFill>
@@ -4005,7 +4005,7 @@
                 </a:solidFill>
               </a:rPr>
               <a:pPr/>
-              <a:t>1/10/2012</a:t>
+              <a:t>9/10/2012</a:t>
             </a:fld>
             <a:endParaRPr lang="en-AU">
               <a:solidFill>
@@ -4207,7 +4207,7 @@
                 </a:solidFill>
               </a:rPr>
               <a:pPr/>
-              <a:t>1/10/2012</a:t>
+              <a:t>9/10/2012</a:t>
             </a:fld>
             <a:endParaRPr lang="en-AU">
               <a:solidFill>
@@ -4485,7 +4485,7 @@
                 </a:solidFill>
               </a:rPr>
               <a:pPr/>
-              <a:t>1/10/2012</a:t>
+              <a:t>9/10/2012</a:t>
             </a:fld>
             <a:endParaRPr lang="en-AU">
               <a:solidFill>
@@ -4805,7 +4805,7 @@
                 </a:solidFill>
               </a:rPr>
               <a:pPr/>
-              <a:t>1/10/2012</a:t>
+              <a:t>9/10/2012</a:t>
             </a:fld>
             <a:endParaRPr lang="en-AU">
               <a:solidFill>
@@ -5259,7 +5259,7 @@
                 </a:solidFill>
               </a:rPr>
               <a:pPr/>
-              <a:t>1/10/2012</a:t>
+              <a:t>9/10/2012</a:t>
             </a:fld>
             <a:endParaRPr lang="en-AU">
               <a:solidFill>
@@ -5409,7 +5409,7 @@
                 </a:solidFill>
               </a:rPr>
               <a:pPr/>
-              <a:t>1/10/2012</a:t>
+              <a:t>9/10/2012</a:t>
             </a:fld>
             <a:endParaRPr lang="en-AU">
               <a:solidFill>
@@ -5536,7 +5536,7 @@
                 </a:solidFill>
               </a:rPr>
               <a:pPr/>
-              <a:t>1/10/2012</a:t>
+              <a:t>9/10/2012</a:t>
             </a:fld>
             <a:endParaRPr lang="en-AU">
               <a:solidFill>
@@ -5814,7 +5814,7 @@
                 </a:solidFill>
               </a:rPr>
               <a:pPr/>
-              <a:t>1/10/2012</a:t>
+              <a:t>9/10/2012</a:t>
             </a:fld>
             <a:endParaRPr lang="en-AU">
               <a:solidFill>
@@ -6123,7 +6123,7 @@
                 </a:solidFill>
               </a:rPr>
               <a:pPr/>
-              <a:t>1/10/2012</a:t>
+              <a:t>9/10/2012</a:t>
             </a:fld>
             <a:endParaRPr lang="en-AU">
               <a:solidFill>
@@ -6408,7 +6408,7 @@
                 </a:solidFill>
               </a:rPr>
               <a:pPr/>
-              <a:t>1/10/2012</a:t>
+              <a:t>9/10/2012</a:t>
             </a:fld>
             <a:endParaRPr lang="en-AU">
               <a:solidFill>
@@ -6610,7 +6610,7 @@
                 </a:solidFill>
               </a:rPr>
               <a:pPr/>
-              <a:t>1/10/2012</a:t>
+              <a:t>9/10/2012</a:t>
             </a:fld>
             <a:endParaRPr lang="en-AU">
               <a:solidFill>
@@ -6822,7 +6822,7 @@
                 </a:solidFill>
               </a:rPr>
               <a:pPr/>
-              <a:t>1/10/2012</a:t>
+              <a:t>9/10/2012</a:t>
             </a:fld>
             <a:endParaRPr lang="en-AU">
               <a:solidFill>
@@ -7096,7 +7096,7 @@
                 </a:solidFill>
               </a:rPr>
               <a:pPr/>
-              <a:t>1/10/2012</a:t>
+              <a:t>9/10/2012</a:t>
             </a:fld>
             <a:endParaRPr lang="en-AU">
               <a:solidFill>
@@ -7298,7 +7298,7 @@
                 </a:solidFill>
               </a:rPr>
               <a:pPr/>
-              <a:t>1/10/2012</a:t>
+              <a:t>9/10/2012</a:t>
             </a:fld>
             <a:endParaRPr lang="en-AU">
               <a:solidFill>
@@ -7576,7 +7576,7 @@
                 </a:solidFill>
               </a:rPr>
               <a:pPr/>
-              <a:t>1/10/2012</a:t>
+              <a:t>9/10/2012</a:t>
             </a:fld>
             <a:endParaRPr lang="en-AU">
               <a:solidFill>
@@ -7896,7 +7896,7 @@
                 </a:solidFill>
               </a:rPr>
               <a:pPr/>
-              <a:t>1/10/2012</a:t>
+              <a:t>9/10/2012</a:t>
             </a:fld>
             <a:endParaRPr lang="en-AU">
               <a:solidFill>
@@ -8350,7 +8350,7 @@
                 </a:solidFill>
               </a:rPr>
               <a:pPr/>
-              <a:t>1/10/2012</a:t>
+              <a:t>9/10/2012</a:t>
             </a:fld>
             <a:endParaRPr lang="en-AU">
               <a:solidFill>
@@ -8500,7 +8500,7 @@
                 </a:solidFill>
               </a:rPr>
               <a:pPr/>
-              <a:t>1/10/2012</a:t>
+              <a:t>9/10/2012</a:t>
             </a:fld>
             <a:endParaRPr lang="en-AU">
               <a:solidFill>
@@ -8820,7 +8820,7 @@
                 </a:solidFill>
               </a:rPr>
               <a:pPr/>
-              <a:t>1/10/2012</a:t>
+              <a:t>9/10/2012</a:t>
             </a:fld>
             <a:endParaRPr lang="en-AU">
               <a:solidFill>
@@ -8947,7 +8947,7 @@
                 </a:solidFill>
               </a:rPr>
               <a:pPr/>
-              <a:t>1/10/2012</a:t>
+              <a:t>9/10/2012</a:t>
             </a:fld>
             <a:endParaRPr lang="en-AU">
               <a:solidFill>
@@ -9256,7 +9256,7 @@
                 </a:solidFill>
               </a:rPr>
               <a:pPr/>
-              <a:t>1/10/2012</a:t>
+              <a:t>9/10/2012</a:t>
             </a:fld>
             <a:endParaRPr lang="en-AU">
               <a:solidFill>
@@ -9541,7 +9541,7 @@
                 </a:solidFill>
               </a:rPr>
               <a:pPr/>
-              <a:t>1/10/2012</a:t>
+              <a:t>9/10/2012</a:t>
             </a:fld>
             <a:endParaRPr lang="en-AU">
               <a:solidFill>
@@ -9743,7 +9743,7 @@
                 </a:solidFill>
               </a:rPr>
               <a:pPr/>
-              <a:t>1/10/2012</a:t>
+              <a:t>9/10/2012</a:t>
             </a:fld>
             <a:endParaRPr lang="en-AU">
               <a:solidFill>
@@ -9955,7 +9955,7 @@
                 </a:solidFill>
               </a:rPr>
               <a:pPr/>
-              <a:t>1/10/2012</a:t>
+              <a:t>9/10/2012</a:t>
             </a:fld>
             <a:endParaRPr lang="en-AU">
               <a:solidFill>
@@ -10409,7 +10409,7 @@
                 </a:solidFill>
               </a:rPr>
               <a:pPr/>
-              <a:t>1/10/2012</a:t>
+              <a:t>9/10/2012</a:t>
             </a:fld>
             <a:endParaRPr lang="en-AU">
               <a:solidFill>
@@ -10559,7 +10559,7 @@
                 </a:solidFill>
               </a:rPr>
               <a:pPr/>
-              <a:t>1/10/2012</a:t>
+              <a:t>9/10/2012</a:t>
             </a:fld>
             <a:endParaRPr lang="en-AU">
               <a:solidFill>
@@ -10686,7 +10686,7 @@
                 </a:solidFill>
               </a:rPr>
               <a:pPr/>
-              <a:t>1/10/2012</a:t>
+              <a:t>9/10/2012</a:t>
             </a:fld>
             <a:endParaRPr lang="en-AU">
               <a:solidFill>
@@ -10995,7 +10995,7 @@
                 </a:solidFill>
               </a:rPr>
               <a:pPr/>
-              <a:t>1/10/2012</a:t>
+              <a:t>9/10/2012</a:t>
             </a:fld>
             <a:endParaRPr lang="en-AU">
               <a:solidFill>
@@ -11280,7 +11280,7 @@
                 </a:solidFill>
               </a:rPr>
               <a:pPr/>
-              <a:t>1/10/2012</a:t>
+              <a:t>9/10/2012</a:t>
             </a:fld>
             <a:endParaRPr lang="en-AU">
               <a:solidFill>
@@ -11525,7 +11525,7 @@
                 </a:solidFill>
               </a:rPr>
               <a:pPr/>
-              <a:t>1/10/2012</a:t>
+              <a:t>9/10/2012</a:t>
             </a:fld>
             <a:endParaRPr lang="en-AU">
               <a:solidFill>
@@ -12067,7 +12067,7 @@
                 </a:solidFill>
               </a:rPr>
               <a:pPr/>
-              <a:t>1/10/2012</a:t>
+              <a:t>9/10/2012</a:t>
             </a:fld>
             <a:endParaRPr lang="en-AU">
               <a:solidFill>
@@ -12609,7 +12609,7 @@
                 </a:solidFill>
               </a:rPr>
               <a:pPr/>
-              <a:t>1/10/2012</a:t>
+              <a:t>9/10/2012</a:t>
             </a:fld>
             <a:endParaRPr lang="en-AU">
               <a:solidFill>
@@ -13151,7 +13151,7 @@
                 </a:solidFill>
               </a:rPr>
               <a:pPr/>
-              <a:t>1/10/2012</a:t>
+              <a:t>9/10/2012</a:t>
             </a:fld>
             <a:endParaRPr lang="en-AU">
               <a:solidFill>
@@ -13608,11 +13608,6 @@
               </a:rPr>
               <a:t>12</a:t>
             </a:r>
-            <a:endParaRPr lang="en-AU" sz="2000" dirty="0">
-              <a:solidFill>
-                <a:prstClr val="black"/>
-              </a:solidFill>
-            </a:endParaRPr>
           </a:p>
         </p:txBody>
       </p:sp>
@@ -13983,11 +13978,6 @@
               </a:rPr>
               <a:t>8pts</a:t>
             </a:r>
-            <a:endParaRPr lang="en-AU" sz="2000" dirty="0">
-              <a:solidFill>
-                <a:prstClr val="black"/>
-              </a:solidFill>
-            </a:endParaRPr>
           </a:p>
         </p:txBody>
       </p:sp>
@@ -14048,11 +14038,6 @@
               </a:rPr>
               <a:t>Should</a:t>
             </a:r>
-            <a:endParaRPr lang="en-AU" sz="2000" dirty="0">
-              <a:solidFill>
-                <a:prstClr val="black"/>
-              </a:solidFill>
-            </a:endParaRPr>
           </a:p>
         </p:txBody>
       </p:sp>
@@ -14123,11 +14108,6 @@
               </a:rPr>
               <a:t> </a:t>
             </a:r>
-            <a:endParaRPr lang="en-AU" sz="2000" dirty="0">
-              <a:solidFill>
-                <a:prstClr val="black"/>
-              </a:solidFill>
-            </a:endParaRPr>
           </a:p>
         </p:txBody>
       </p:sp>
@@ -14218,11 +14198,6 @@
               </a:rPr>
               <a:t>10</a:t>
             </a:r>
-            <a:endParaRPr lang="en-AU" sz="2000" dirty="0">
-              <a:solidFill>
-                <a:prstClr val="black"/>
-              </a:solidFill>
-            </a:endParaRPr>
           </a:p>
         </p:txBody>
       </p:sp>
@@ -14277,11 +14252,6 @@
               </a:rPr>
               <a:t>Calculations/Database – Optimal Package Part2</a:t>
             </a:r>
-            <a:endParaRPr lang="en-AU" sz="2800" dirty="0">
-              <a:solidFill>
-                <a:prstClr val="white"/>
-              </a:solidFill>
-            </a:endParaRPr>
           </a:p>
         </p:txBody>
       </p:sp>
@@ -14465,7 +14435,23 @@
                   <a:prstClr val="black"/>
                 </a:solidFill>
               </a:rPr>
-              <a:t>show users optimal degrees and directions settings in different seasons.</a:t>
+              <a:t>show users optimal </a:t>
+            </a:r>
+            <a:r>
+              <a:rPr lang="en-AU" sz="2000" dirty="0" smtClean="0">
+                <a:solidFill>
+                  <a:prstClr val="black"/>
+                </a:solidFill>
+              </a:rPr>
+              <a:t>settings </a:t>
+            </a:r>
+            <a:r>
+              <a:rPr lang="en-AU" sz="2000" dirty="0" smtClean="0">
+                <a:solidFill>
+                  <a:prstClr val="black"/>
+                </a:solidFill>
+              </a:rPr>
+              <a:t>in different seasons.</a:t>
             </a:r>
             <a:endParaRPr lang="en-AU" sz="2000" dirty="0">
               <a:solidFill>
@@ -14542,11 +14528,6 @@
               </a:rPr>
               <a:t>8pts</a:t>
             </a:r>
-            <a:endParaRPr lang="en-AU" sz="2000" dirty="0">
-              <a:solidFill>
-                <a:prstClr val="black"/>
-              </a:solidFill>
-            </a:endParaRPr>
           </a:p>
         </p:txBody>
       </p:sp>
@@ -14607,11 +14588,6 @@
               </a:rPr>
               <a:t>Could</a:t>
             </a:r>
-            <a:endParaRPr lang="en-AU" sz="2000" dirty="0">
-              <a:solidFill>
-                <a:prstClr val="black"/>
-              </a:solidFill>
-            </a:endParaRPr>
           </a:p>
         </p:txBody>
       </p:sp>
@@ -14777,11 +14753,6 @@
               </a:rPr>
               <a:t>13</a:t>
             </a:r>
-            <a:endParaRPr lang="en-AU" sz="2000" dirty="0">
-              <a:solidFill>
-                <a:prstClr val="black"/>
-              </a:solidFill>
-            </a:endParaRPr>
           </a:p>
         </p:txBody>
       </p:sp>
@@ -14836,11 +14807,6 @@
               </a:rPr>
               <a:t>App-Feature – Multiple Clusters</a:t>
             </a:r>
-            <a:endParaRPr lang="en-AU" sz="2800" dirty="0">
-              <a:solidFill>
-                <a:prstClr val="white"/>
-              </a:solidFill>
-            </a:endParaRPr>
           </a:p>
         </p:txBody>
       </p:sp>
@@ -14898,8 +14864,21 @@
                   <a:prstClr val="black"/>
                 </a:solidFill>
               </a:rPr>
-              <a:t>As a current owner of a solar system, I want to be able to define multiple panel clusters rather than a single so that I can still attain accurate information even if I have multiple sets of solar panels that point in different directions/have different properties.</a:t>
-            </a:r>
+              <a:t>As a current owner of a solar system, I want to be able to define multiple panel clusters rather than a single so that I can still attain accurate information even if I have multiple sets of solar panels that point in different </a:t>
+            </a:r>
+            <a:r>
+              <a:rPr lang="en-AU" sz="2400" dirty="0" smtClean="0">
+                <a:solidFill>
+                  <a:prstClr val="black"/>
+                </a:solidFill>
+              </a:rPr>
+              <a:t>directions.</a:t>
+            </a:r>
+            <a:endParaRPr lang="en-AU" sz="2400" dirty="0">
+              <a:solidFill>
+                <a:prstClr val="black"/>
+              </a:solidFill>
+            </a:endParaRPr>
           </a:p>
         </p:txBody>
       </p:sp>
@@ -15037,11 +15016,6 @@
               </a:rPr>
               <a:t>8pts</a:t>
             </a:r>
-            <a:endParaRPr lang="en-AU" sz="2000" dirty="0">
-              <a:solidFill>
-                <a:prstClr val="black"/>
-              </a:solidFill>
-            </a:endParaRPr>
           </a:p>
         </p:txBody>
       </p:sp>
@@ -15102,11 +15076,6 @@
               </a:rPr>
               <a:t>Should</a:t>
             </a:r>
-            <a:endParaRPr lang="en-AU" sz="2000" dirty="0">
-              <a:solidFill>
-                <a:prstClr val="black"/>
-              </a:solidFill>
-            </a:endParaRPr>
           </a:p>
         </p:txBody>
       </p:sp>
@@ -15165,26 +15134,6 @@
             </a:r>
           </a:p>
           <a:p>
-            <a:pPr marL="179388" indent="-179388">
-              <a:buFont typeface="Arial" pitchFamily="34" charset="0"/>
-              <a:buChar char="•"/>
-            </a:pPr>
-            <a:r>
-              <a:rPr lang="en-AU" sz="2000" dirty="0">
-                <a:solidFill>
-                  <a:prstClr val="black"/>
-                </a:solidFill>
-              </a:rPr>
-              <a:t> </a:t>
-            </a:r>
-            <a:r>
-              <a:rPr lang="en-AU" sz="2000" dirty="0" smtClean="0">
-                <a:solidFill>
-                  <a:prstClr val="black"/>
-                </a:solidFill>
-              </a:rPr>
-              <a:t>one of minimum requirements</a:t>
-            </a:r>
             <a:endParaRPr lang="en-AU" sz="2000" dirty="0">
               <a:solidFill>
                 <a:prstClr val="black"/>
@@ -15280,11 +15229,6 @@
               </a:rPr>
               <a:t>12</a:t>
             </a:r>
-            <a:endParaRPr lang="en-AU" sz="2000" dirty="0">
-              <a:solidFill>
-                <a:prstClr val="black"/>
-              </a:solidFill>
-            </a:endParaRPr>
           </a:p>
         </p:txBody>
       </p:sp>
@@ -15337,7 +15281,7 @@
                   <a:prstClr val="white"/>
                 </a:solidFill>
               </a:rPr>
-              <a:t>Actual generation</a:t>
+              <a:t>Sola rebates</a:t>
             </a:r>
             <a:endParaRPr lang="en-AU" sz="2800" dirty="0">
               <a:solidFill>
@@ -15409,7 +15353,7 @@
                   <a:prstClr val="black"/>
                 </a:solidFill>
               </a:rPr>
-              <a:t>current user</a:t>
+              <a:t>potential buyer, </a:t>
             </a:r>
             <a:r>
               <a:rPr lang="en-AU" sz="2400" dirty="0">
@@ -15417,7 +15361,7 @@
                   <a:prstClr val="black"/>
                 </a:solidFill>
               </a:rPr>
-              <a:t>, I want </a:t>
+              <a:t>I want </a:t>
             </a:r>
             <a:r>
               <a:rPr lang="en-AU" sz="2400" dirty="0" smtClean="0">
@@ -15425,7 +15369,15 @@
                   <a:prstClr val="black"/>
                 </a:solidFill>
               </a:rPr>
-              <a:t>to know how much electricity my solar system should generate, </a:t>
+              <a:t>to know how much </a:t>
+            </a:r>
+            <a:r>
+              <a:rPr lang="en-AU" sz="2400" dirty="0" smtClean="0">
+                <a:solidFill>
+                  <a:prstClr val="black"/>
+                </a:solidFill>
+              </a:rPr>
+              <a:t>solar rebates I can expect in my location, </a:t>
             </a:r>
             <a:r>
               <a:rPr lang="en-AU" sz="2400" dirty="0">
@@ -15441,7 +15393,15 @@
                   <a:prstClr val="black"/>
                 </a:solidFill>
               </a:rPr>
-              <a:t>I can compare it with the actual system generation output.</a:t>
+              <a:t>I </a:t>
+            </a:r>
+            <a:r>
+              <a:rPr lang="en-AU" sz="2400" dirty="0" smtClean="0">
+                <a:solidFill>
+                  <a:prstClr val="black"/>
+                </a:solidFill>
+              </a:rPr>
+              <a:t>know how much money I will save from solar rebates</a:t>
             </a:r>
             <a:endParaRPr lang="en-AU" sz="2400" dirty="0">
               <a:solidFill>
@@ -15527,34 +15487,7 @@
                   <a:prstClr val="black"/>
                 </a:solidFill>
               </a:rPr>
-              <a:t>calculate daily generations taken account of purchase time, location, month</a:t>
-            </a:r>
-            <a:endParaRPr lang="en-AU" sz="2000" dirty="0">
-              <a:solidFill>
-                <a:prstClr val="black"/>
-              </a:solidFill>
-            </a:endParaRPr>
-          </a:p>
-          <a:p>
-            <a:pPr>
-              <a:buFont typeface="Arial" pitchFamily="34" charset="0"/>
-              <a:buChar char="•"/>
-            </a:pPr>
-            <a:r>
-              <a:rPr lang="en-AU" sz="2000" dirty="0">
-                <a:solidFill>
-                  <a:prstClr val="black"/>
-                </a:solidFill>
-              </a:rPr>
-              <a:t> </a:t>
-            </a:r>
-            <a:r>
-              <a:rPr lang="en-AU" sz="2000" dirty="0" smtClean="0">
-                <a:solidFill>
-                  <a:prstClr val="black"/>
-                </a:solidFill>
-              </a:rPr>
-              <a:t>display daily calculation result to user.</a:t>
+              <a:t>display expected solar rebates in dollars for major cities  </a:t>
             </a:r>
             <a:endParaRPr lang="en-AU" sz="2000" dirty="0">
               <a:solidFill>
@@ -15618,7 +15551,15 @@
                   <a:prstClr val="black"/>
                 </a:solidFill>
               </a:rPr>
-              <a:t>8pts</a:t>
+              <a:t>2</a:t>
+            </a:r>
+            <a:r>
+              <a:rPr lang="en-AU" sz="2000" smtClean="0">
+                <a:solidFill>
+                  <a:prstClr val="black"/>
+                </a:solidFill>
+              </a:rPr>
+              <a:t>pts</a:t>
             </a:r>
             <a:endParaRPr lang="en-AU" sz="2000" dirty="0">
               <a:solidFill>
@@ -15678,12 +15619,12 @@
           <a:p>
             <a:pPr algn="ctr"/>
             <a:r>
-              <a:rPr lang="en-AU" sz="2000" dirty="0">
+              <a:rPr lang="en-AU" sz="2000" dirty="0" smtClean="0">
                 <a:solidFill>
                   <a:prstClr val="black"/>
                 </a:solidFill>
               </a:rPr>
-              <a:t>Should</a:t>
+              <a:t>Could</a:t>
             </a:r>
             <a:endParaRPr lang="en-AU" sz="2000" dirty="0">
               <a:solidFill>
@@ -15863,11 +15804,6 @@
               </a:rPr>
               <a:t>9</a:t>
             </a:r>
-            <a:endParaRPr lang="en-AU" sz="2000" dirty="0">
-              <a:solidFill>
-                <a:prstClr val="black"/>
-              </a:solidFill>
-            </a:endParaRPr>
           </a:p>
         </p:txBody>
       </p:sp>
@@ -15922,11 +15858,6 @@
               </a:rPr>
               <a:t>Calculations – Return of Investment</a:t>
             </a:r>
-            <a:endParaRPr lang="en-AU" sz="2800" dirty="0">
-              <a:solidFill>
-                <a:prstClr val="white"/>
-              </a:solidFill>
-            </a:endParaRPr>
           </a:p>
         </p:txBody>
       </p:sp>
@@ -16043,22 +15974,31 @@
                   <a:prstClr val="black"/>
                 </a:solidFill>
               </a:rPr>
-              <a:t>Acceptance Criteria</a:t>
-            </a:r>
-          </a:p>
-          <a:p>
-            <a:pPr marL="179388" indent="-179388">
-              <a:buFont typeface="Arial" pitchFamily="34" charset="0"/>
-              <a:buChar char="•"/>
-            </a:pPr>
-            <a:r>
-              <a:rPr lang="en-AU" sz="2000" dirty="0">
+              <a:t>Acceptance </a:t>
+            </a:r>
+            <a:r>
+              <a:rPr lang="en-AU" sz="2000" dirty="0" smtClean="0">
                 <a:solidFill>
                   <a:prstClr val="black"/>
                 </a:solidFill>
               </a:rPr>
-              <a:t>Calculate the amount of money earned/lost from deploying a system </a:t>
-            </a:r>
+              <a:t>Criteria</a:t>
+            </a:r>
+          </a:p>
+          <a:p>
+            <a:r>
+              <a:rPr lang="en-AU" sz="2000" dirty="0" smtClean="0">
+                <a:solidFill>
+                  <a:prstClr val="black"/>
+                </a:solidFill>
+              </a:rPr>
+              <a:t>Display ROI figures for solar power investment and high interest savings investment</a:t>
+            </a:r>
+            <a:endParaRPr lang="en-AU" sz="2000" dirty="0">
+              <a:solidFill>
+                <a:prstClr val="black"/>
+              </a:solidFill>
+            </a:endParaRPr>
           </a:p>
         </p:txBody>
       </p:sp>
@@ -16118,11 +16058,6 @@
               </a:rPr>
               <a:t>2pts</a:t>
             </a:r>
-            <a:endParaRPr lang="en-AU" sz="2000" dirty="0">
-              <a:solidFill>
-                <a:prstClr val="black"/>
-              </a:solidFill>
-            </a:endParaRPr>
           </a:p>
         </p:txBody>
       </p:sp>
@@ -16183,11 +16118,6 @@
               </a:rPr>
               <a:t>Could</a:t>
             </a:r>
-            <a:endParaRPr lang="en-AU" sz="2000" dirty="0">
-              <a:solidFill>
-                <a:prstClr val="black"/>
-              </a:solidFill>
-            </a:endParaRPr>
           </a:p>
         </p:txBody>
       </p:sp>

</xml_diff>